<commit_message>
bridge ppt 설명 add
</commit_message>
<xml_diff>
--- a/Structural_Pattern 정리.pptx
+++ b/Structural_Pattern 정리.pptx
@@ -104,6 +104,11 @@
       </a:defRPr>
     </a:lvl9pPr>
   </p:defaultTextStyle>
+  <p:extLst>
+    <p:ext uri="{EFAFB233-063F-42B5-8137-9DF3F51BA10A}">
+      <p15:sldGuideLst xmlns:p15="http://schemas.microsoft.com/office/powerpoint/2012/main"/>
+    </p:ext>
+  </p:extLst>
 </p:presentation>
 </file>
 
@@ -132,6 +137,23 @@
       </a:p>
     </p188:txBody>
   </p188:cm>
+  <p188:cm id="{5901D2F9-8ED5-40F0-9A63-D6A1B76A00D1}" authorId="{7EAAE9FC-B4E7-9735-A0F8-D46B1FBCB8AF}" created="2023-03-17T02:53:45.455">
+    <ac:deMkLst xmlns:ac="http://schemas.microsoft.com/office/drawing/2013/main/command">
+      <pc:docMk xmlns:pc="http://schemas.microsoft.com/office/powerpoint/2013/main/command"/>
+      <pc:sldMk xmlns:pc="http://schemas.microsoft.com/office/powerpoint/2013/main/command" cId="3919506353" sldId="256"/>
+      <ac:spMk id="3" creationId="{3E9D3588-15CB-D1F5-6D8C-D2266229FFFF}"/>
+    </ac:deMkLst>
+    <p188:txBody>
+      <a:bodyPr/>
+      <a:lstStyle/>
+      <a:p>
+        <a:r>
+          <a:rPr lang="ko-KR" altLang="en-US"/>
+          <a:t>추상층과 분리하여 구현부이 자유롭도록 함.</a:t>
+        </a:r>
+      </a:p>
+    </p188:txBody>
+  </p188:cm>
 </p188:cmLst>
 </file>
 
@@ -282,7 +304,7 @@
           <a:p>
             <a:fld id="{AAF5C761-5613-44C6-BA4F-9AD88F585A93}" type="datetimeFigureOut">
               <a:rPr lang="ko-KR" altLang="en-US" smtClean="0"/>
-              <a:t>2023-03-16</a:t>
+              <a:t>2023-03-17</a:t>
             </a:fld>
             <a:endParaRPr lang="ko-KR" altLang="en-US"/>
           </a:p>
@@ -480,7 +502,7 @@
           <a:p>
             <a:fld id="{AAF5C761-5613-44C6-BA4F-9AD88F585A93}" type="datetimeFigureOut">
               <a:rPr lang="ko-KR" altLang="en-US" smtClean="0"/>
-              <a:t>2023-03-16</a:t>
+              <a:t>2023-03-17</a:t>
             </a:fld>
             <a:endParaRPr lang="ko-KR" altLang="en-US"/>
           </a:p>
@@ -688,7 +710,7 @@
           <a:p>
             <a:fld id="{AAF5C761-5613-44C6-BA4F-9AD88F585A93}" type="datetimeFigureOut">
               <a:rPr lang="ko-KR" altLang="en-US" smtClean="0"/>
-              <a:t>2023-03-16</a:t>
+              <a:t>2023-03-17</a:t>
             </a:fld>
             <a:endParaRPr lang="ko-KR" altLang="en-US"/>
           </a:p>
@@ -886,7 +908,7 @@
           <a:p>
             <a:fld id="{AAF5C761-5613-44C6-BA4F-9AD88F585A93}" type="datetimeFigureOut">
               <a:rPr lang="ko-KR" altLang="en-US" smtClean="0"/>
-              <a:t>2023-03-16</a:t>
+              <a:t>2023-03-17</a:t>
             </a:fld>
             <a:endParaRPr lang="ko-KR" altLang="en-US"/>
           </a:p>
@@ -1161,7 +1183,7 @@
           <a:p>
             <a:fld id="{AAF5C761-5613-44C6-BA4F-9AD88F585A93}" type="datetimeFigureOut">
               <a:rPr lang="ko-KR" altLang="en-US" smtClean="0"/>
-              <a:t>2023-03-16</a:t>
+              <a:t>2023-03-17</a:t>
             </a:fld>
             <a:endParaRPr lang="ko-KR" altLang="en-US"/>
           </a:p>
@@ -1426,7 +1448,7 @@
           <a:p>
             <a:fld id="{AAF5C761-5613-44C6-BA4F-9AD88F585A93}" type="datetimeFigureOut">
               <a:rPr lang="ko-KR" altLang="en-US" smtClean="0"/>
-              <a:t>2023-03-16</a:t>
+              <a:t>2023-03-17</a:t>
             </a:fld>
             <a:endParaRPr lang="ko-KR" altLang="en-US"/>
           </a:p>
@@ -1838,7 +1860,7 @@
           <a:p>
             <a:fld id="{AAF5C761-5613-44C6-BA4F-9AD88F585A93}" type="datetimeFigureOut">
               <a:rPr lang="ko-KR" altLang="en-US" smtClean="0"/>
-              <a:t>2023-03-16</a:t>
+              <a:t>2023-03-17</a:t>
             </a:fld>
             <a:endParaRPr lang="ko-KR" altLang="en-US"/>
           </a:p>
@@ -1979,7 +2001,7 @@
           <a:p>
             <a:fld id="{AAF5C761-5613-44C6-BA4F-9AD88F585A93}" type="datetimeFigureOut">
               <a:rPr lang="ko-KR" altLang="en-US" smtClean="0"/>
-              <a:t>2023-03-16</a:t>
+              <a:t>2023-03-17</a:t>
             </a:fld>
             <a:endParaRPr lang="ko-KR" altLang="en-US"/>
           </a:p>
@@ -2092,7 +2114,7 @@
           <a:p>
             <a:fld id="{AAF5C761-5613-44C6-BA4F-9AD88F585A93}" type="datetimeFigureOut">
               <a:rPr lang="ko-KR" altLang="en-US" smtClean="0"/>
-              <a:t>2023-03-16</a:t>
+              <a:t>2023-03-17</a:t>
             </a:fld>
             <a:endParaRPr lang="ko-KR" altLang="en-US"/>
           </a:p>
@@ -2403,7 +2425,7 @@
           <a:p>
             <a:fld id="{AAF5C761-5613-44C6-BA4F-9AD88F585A93}" type="datetimeFigureOut">
               <a:rPr lang="ko-KR" altLang="en-US" smtClean="0"/>
-              <a:t>2023-03-16</a:t>
+              <a:t>2023-03-17</a:t>
             </a:fld>
             <a:endParaRPr lang="ko-KR" altLang="en-US"/>
           </a:p>
@@ -2691,7 +2713,7 @@
           <a:p>
             <a:fld id="{AAF5C761-5613-44C6-BA4F-9AD88F585A93}" type="datetimeFigureOut">
               <a:rPr lang="ko-KR" altLang="en-US" smtClean="0"/>
-              <a:t>2023-03-16</a:t>
+              <a:t>2023-03-17</a:t>
             </a:fld>
             <a:endParaRPr lang="ko-KR" altLang="en-US"/>
           </a:p>
@@ -2932,7 +2954,7 @@
           <a:p>
             <a:fld id="{AAF5C761-5613-44C6-BA4F-9AD88F585A93}" type="datetimeFigureOut">
               <a:rPr lang="ko-KR" altLang="en-US" smtClean="0"/>
-              <a:t>2023-03-16</a:t>
+              <a:t>2023-03-17</a:t>
             </a:fld>
             <a:endParaRPr lang="ko-KR" altLang="en-US"/>
           </a:p>
@@ -3563,7 +3585,7 @@
         </p:nvSpPr>
         <p:spPr>
           <a:xfrm>
-            <a:off x="1379857" y="1706301"/>
+            <a:off x="1379857" y="1706303"/>
             <a:ext cx="1921398" cy="951051"/>
           </a:xfrm>
           <a:prstGeom prst="ellipse">
@@ -3615,8 +3637,8 @@
           <p:nvPr/>
         </p:nvCxnSpPr>
         <p:spPr>
-          <a:xfrm>
-            <a:off x="3301255" y="2181827"/>
+          <a:xfrm flipV="1">
+            <a:off x="3301255" y="2181828"/>
             <a:ext cx="784608" cy="1"/>
           </a:xfrm>
           <a:prstGeom prst="straightConnector1">
@@ -3723,6 +3745,561 @@
           </a:fillRef>
           <a:effectRef idx="0">
             <a:schemeClr val="accent2"/>
+          </a:effectRef>
+          <a:fontRef idx="minor">
+            <a:schemeClr val="tx1"/>
+          </a:fontRef>
+        </p:style>
+      </p:cxnSp>
+      <p:sp>
+        <p:nvSpPr>
+          <p:cNvPr id="2" name="TextBox 1">
+            <a:extLst>
+              <a:ext uri="{FF2B5EF4-FFF2-40B4-BE49-F238E27FC236}">
+                <a16:creationId xmlns:a16="http://schemas.microsoft.com/office/drawing/2014/main" id="{9AAD0550-DEFF-4E73-6CA8-C4E543AFE432}"/>
+              </a:ext>
+            </a:extLst>
+          </p:cNvPr>
+          <p:cNvSpPr txBox="1"/>
+          <p:nvPr/>
+        </p:nvSpPr>
+        <p:spPr>
+          <a:xfrm>
+            <a:off x="1088020" y="3809149"/>
+            <a:ext cx="1762021" cy="369332"/>
+          </a:xfrm>
+          <a:prstGeom prst="rect">
+            <a:avLst/>
+          </a:prstGeom>
+          <a:noFill/>
+        </p:spPr>
+        <p:txBody>
+          <a:bodyPr wrap="none" rtlCol="0">
+            <a:spAutoFit/>
+          </a:bodyPr>
+          <a:lstStyle/>
+          <a:p>
+            <a:r>
+              <a:rPr lang="ko-KR" altLang="en-US" dirty="0"/>
+              <a:t>가교</a:t>
+            </a:r>
+            <a:r>
+              <a:rPr lang="en-US" altLang="ko-KR" dirty="0"/>
+              <a:t> (bridge) : </a:t>
+            </a:r>
+            <a:endParaRPr lang="ko-KR" altLang="en-US" dirty="0"/>
+          </a:p>
+        </p:txBody>
+      </p:sp>
+      <p:sp>
+        <p:nvSpPr>
+          <p:cNvPr id="3" name="직사각형 2">
+            <a:extLst>
+              <a:ext uri="{FF2B5EF4-FFF2-40B4-BE49-F238E27FC236}">
+                <a16:creationId xmlns:a16="http://schemas.microsoft.com/office/drawing/2014/main" id="{3E9D3588-15CB-D1F5-6D8C-D2266229FFFF}"/>
+              </a:ext>
+            </a:extLst>
+          </p:cNvPr>
+          <p:cNvSpPr/>
+          <p:nvPr/>
+        </p:nvSpPr>
+        <p:spPr>
+          <a:xfrm>
+            <a:off x="3558103" y="4561114"/>
+            <a:ext cx="2449158" cy="682907"/>
+          </a:xfrm>
+          <a:prstGeom prst="rect">
+            <a:avLst/>
+          </a:prstGeom>
+        </p:spPr>
+        <p:style>
+          <a:lnRef idx="2">
+            <a:schemeClr val="accent1">
+              <a:shade val="50000"/>
+            </a:schemeClr>
+          </a:lnRef>
+          <a:fillRef idx="1">
+            <a:schemeClr val="accent1"/>
+          </a:fillRef>
+          <a:effectRef idx="0">
+            <a:schemeClr val="accent1"/>
+          </a:effectRef>
+          <a:fontRef idx="minor">
+            <a:schemeClr val="lt1"/>
+          </a:fontRef>
+        </p:style>
+        <p:txBody>
+          <a:bodyPr rtlCol="0" anchor="ctr"/>
+          <a:lstStyle/>
+          <a:p>
+            <a:pPr algn="ctr"/>
+            <a:r>
+              <a:rPr lang="en-US" altLang="ko-KR" dirty="0"/>
+              <a:t>Abstraction</a:t>
+            </a:r>
+            <a:endParaRPr lang="ko-KR" altLang="en-US" dirty="0"/>
+          </a:p>
+        </p:txBody>
+      </p:sp>
+      <p:sp>
+        <p:nvSpPr>
+          <p:cNvPr id="9" name="직사각형 8">
+            <a:extLst>
+              <a:ext uri="{FF2B5EF4-FFF2-40B4-BE49-F238E27FC236}">
+                <a16:creationId xmlns:a16="http://schemas.microsoft.com/office/drawing/2014/main" id="{18AC5C62-6428-663E-CCD0-E13250C7159B}"/>
+              </a:ext>
+            </a:extLst>
+          </p:cNvPr>
+          <p:cNvSpPr/>
+          <p:nvPr/>
+        </p:nvSpPr>
+        <p:spPr>
+          <a:xfrm>
+            <a:off x="3558103" y="5662638"/>
+            <a:ext cx="2449158" cy="682907"/>
+          </a:xfrm>
+          <a:prstGeom prst="rect">
+            <a:avLst/>
+          </a:prstGeom>
+        </p:spPr>
+        <p:style>
+          <a:lnRef idx="2">
+            <a:schemeClr val="accent1">
+              <a:shade val="50000"/>
+            </a:schemeClr>
+          </a:lnRef>
+          <a:fillRef idx="1">
+            <a:schemeClr val="accent1"/>
+          </a:fillRef>
+          <a:effectRef idx="0">
+            <a:schemeClr val="accent1"/>
+          </a:effectRef>
+          <a:fontRef idx="minor">
+            <a:schemeClr val="lt1"/>
+          </a:fontRef>
+        </p:style>
+        <p:txBody>
+          <a:bodyPr rtlCol="0" anchor="ctr"/>
+          <a:lstStyle/>
+          <a:p>
+            <a:pPr algn="ctr"/>
+            <a:r>
+              <a:rPr lang="en-US" altLang="ko-KR" dirty="0" err="1"/>
+              <a:t>ExtendedAbstraction</a:t>
+            </a:r>
+            <a:endParaRPr lang="ko-KR" altLang="en-US" dirty="0"/>
+          </a:p>
+        </p:txBody>
+      </p:sp>
+      <p:sp>
+        <p:nvSpPr>
+          <p:cNvPr id="11" name="직사각형 10">
+            <a:extLst>
+              <a:ext uri="{FF2B5EF4-FFF2-40B4-BE49-F238E27FC236}">
+                <a16:creationId xmlns:a16="http://schemas.microsoft.com/office/drawing/2014/main" id="{976DB6B6-34D2-9DA8-E8C0-464D5B158B26}"/>
+              </a:ext>
+            </a:extLst>
+          </p:cNvPr>
+          <p:cNvSpPr/>
+          <p:nvPr/>
+        </p:nvSpPr>
+        <p:spPr>
+          <a:xfrm>
+            <a:off x="7894211" y="4548298"/>
+            <a:ext cx="2449158" cy="682907"/>
+          </a:xfrm>
+          <a:prstGeom prst="rect">
+            <a:avLst/>
+          </a:prstGeom>
+        </p:spPr>
+        <p:style>
+          <a:lnRef idx="2">
+            <a:schemeClr val="accent1">
+              <a:shade val="50000"/>
+            </a:schemeClr>
+          </a:lnRef>
+          <a:fillRef idx="1">
+            <a:schemeClr val="accent1"/>
+          </a:fillRef>
+          <a:effectRef idx="0">
+            <a:schemeClr val="accent1"/>
+          </a:effectRef>
+          <a:fontRef idx="minor">
+            <a:schemeClr val="lt1"/>
+          </a:fontRef>
+        </p:style>
+        <p:txBody>
+          <a:bodyPr rtlCol="0" anchor="ctr"/>
+          <a:lstStyle/>
+          <a:p>
+            <a:pPr algn="ctr"/>
+            <a:r>
+              <a:rPr lang="en-US" altLang="ko-KR" dirty="0"/>
+              <a:t>Implementation</a:t>
+            </a:r>
+            <a:endParaRPr lang="ko-KR" altLang="en-US" dirty="0"/>
+          </a:p>
+        </p:txBody>
+      </p:sp>
+      <p:sp>
+        <p:nvSpPr>
+          <p:cNvPr id="13" name="직사각형 12">
+            <a:extLst>
+              <a:ext uri="{FF2B5EF4-FFF2-40B4-BE49-F238E27FC236}">
+                <a16:creationId xmlns:a16="http://schemas.microsoft.com/office/drawing/2014/main" id="{FC7FFCB6-D8F8-2EDC-1715-D9CA19738D29}"/>
+              </a:ext>
+            </a:extLst>
+          </p:cNvPr>
+          <p:cNvSpPr/>
+          <p:nvPr/>
+        </p:nvSpPr>
+        <p:spPr>
+          <a:xfrm>
+            <a:off x="6812116" y="5662637"/>
+            <a:ext cx="2164189" cy="682907"/>
+          </a:xfrm>
+          <a:prstGeom prst="rect">
+            <a:avLst/>
+          </a:prstGeom>
+        </p:spPr>
+        <p:style>
+          <a:lnRef idx="2">
+            <a:schemeClr val="accent1">
+              <a:shade val="50000"/>
+            </a:schemeClr>
+          </a:lnRef>
+          <a:fillRef idx="1">
+            <a:schemeClr val="accent1"/>
+          </a:fillRef>
+          <a:effectRef idx="0">
+            <a:schemeClr val="accent1"/>
+          </a:effectRef>
+          <a:fontRef idx="minor">
+            <a:schemeClr val="lt1"/>
+          </a:fontRef>
+        </p:style>
+        <p:txBody>
+          <a:bodyPr rtlCol="0" anchor="ctr"/>
+          <a:lstStyle/>
+          <a:p>
+            <a:pPr algn="ctr"/>
+            <a:r>
+              <a:rPr lang="en-US" altLang="ko-KR" dirty="0" err="1"/>
+              <a:t>ConcreteImplementationA</a:t>
+            </a:r>
+            <a:endParaRPr lang="ko-KR" altLang="en-US" dirty="0"/>
+          </a:p>
+        </p:txBody>
+      </p:sp>
+      <p:sp>
+        <p:nvSpPr>
+          <p:cNvPr id="14" name="직사각형 13">
+            <a:extLst>
+              <a:ext uri="{FF2B5EF4-FFF2-40B4-BE49-F238E27FC236}">
+                <a16:creationId xmlns:a16="http://schemas.microsoft.com/office/drawing/2014/main" id="{B530042D-E964-1295-64CC-1287919CB994}"/>
+              </a:ext>
+            </a:extLst>
+          </p:cNvPr>
+          <p:cNvSpPr/>
+          <p:nvPr/>
+        </p:nvSpPr>
+        <p:spPr>
+          <a:xfrm>
+            <a:off x="9359373" y="5662636"/>
+            <a:ext cx="2164189" cy="682907"/>
+          </a:xfrm>
+          <a:prstGeom prst="rect">
+            <a:avLst/>
+          </a:prstGeom>
+        </p:spPr>
+        <p:style>
+          <a:lnRef idx="2">
+            <a:schemeClr val="accent1">
+              <a:shade val="50000"/>
+            </a:schemeClr>
+          </a:lnRef>
+          <a:fillRef idx="1">
+            <a:schemeClr val="accent1"/>
+          </a:fillRef>
+          <a:effectRef idx="0">
+            <a:schemeClr val="accent1"/>
+          </a:effectRef>
+          <a:fontRef idx="minor">
+            <a:schemeClr val="lt1"/>
+          </a:fontRef>
+        </p:style>
+        <p:txBody>
+          <a:bodyPr rtlCol="0" anchor="ctr"/>
+          <a:lstStyle/>
+          <a:p>
+            <a:pPr algn="ctr"/>
+            <a:r>
+              <a:rPr lang="en-US" altLang="ko-KR" dirty="0" err="1"/>
+              <a:t>ConcreteImplementationB</a:t>
+            </a:r>
+            <a:endParaRPr lang="ko-KR" altLang="en-US" dirty="0"/>
+          </a:p>
+        </p:txBody>
+      </p:sp>
+      <p:cxnSp>
+        <p:nvCxnSpPr>
+          <p:cNvPr id="17" name="직선 화살표 연결선 16">
+            <a:extLst>
+              <a:ext uri="{FF2B5EF4-FFF2-40B4-BE49-F238E27FC236}">
+                <a16:creationId xmlns:a16="http://schemas.microsoft.com/office/drawing/2014/main" id="{339E7C1A-245E-8249-5CED-BB3301471AA7}"/>
+              </a:ext>
+            </a:extLst>
+          </p:cNvPr>
+          <p:cNvCxnSpPr>
+            <a:stCxn id="3" idx="2"/>
+            <a:endCxn id="9" idx="0"/>
+          </p:cNvCxnSpPr>
+          <p:nvPr/>
+        </p:nvCxnSpPr>
+        <p:spPr>
+          <a:xfrm>
+            <a:off x="4782682" y="5244021"/>
+            <a:ext cx="0" cy="418617"/>
+          </a:xfrm>
+          <a:prstGeom prst="straightConnector1">
+            <a:avLst/>
+          </a:prstGeom>
+          <a:ln>
+            <a:tailEnd type="triangle"/>
+          </a:ln>
+        </p:spPr>
+        <p:style>
+          <a:lnRef idx="1">
+            <a:schemeClr val="accent1"/>
+          </a:lnRef>
+          <a:fillRef idx="0">
+            <a:schemeClr val="accent1"/>
+          </a:fillRef>
+          <a:effectRef idx="0">
+            <a:schemeClr val="accent1"/>
+          </a:effectRef>
+          <a:fontRef idx="minor">
+            <a:schemeClr val="tx1"/>
+          </a:fontRef>
+        </p:style>
+      </p:cxnSp>
+      <p:cxnSp>
+        <p:nvCxnSpPr>
+          <p:cNvPr id="19" name="연결선: 꺾임 18">
+            <a:extLst>
+              <a:ext uri="{FF2B5EF4-FFF2-40B4-BE49-F238E27FC236}">
+                <a16:creationId xmlns:a16="http://schemas.microsoft.com/office/drawing/2014/main" id="{2942C7D8-2AE6-5A7E-F53B-F8F21A7B38B1}"/>
+              </a:ext>
+            </a:extLst>
+          </p:cNvPr>
+          <p:cNvCxnSpPr>
+            <a:stCxn id="11" idx="2"/>
+            <a:endCxn id="13" idx="0"/>
+          </p:cNvCxnSpPr>
+          <p:nvPr/>
+        </p:nvCxnSpPr>
+        <p:spPr>
+          <a:xfrm rot="5400000">
+            <a:off x="8290785" y="4834632"/>
+            <a:ext cx="431432" cy="1224579"/>
+          </a:xfrm>
+          <a:prstGeom prst="bentConnector3">
+            <a:avLst/>
+          </a:prstGeom>
+          <a:ln>
+            <a:tailEnd type="triangle"/>
+          </a:ln>
+        </p:spPr>
+        <p:style>
+          <a:lnRef idx="1">
+            <a:schemeClr val="accent1"/>
+          </a:lnRef>
+          <a:fillRef idx="0">
+            <a:schemeClr val="accent1"/>
+          </a:fillRef>
+          <a:effectRef idx="0">
+            <a:schemeClr val="accent1"/>
+          </a:effectRef>
+          <a:fontRef idx="minor">
+            <a:schemeClr val="tx1"/>
+          </a:fontRef>
+        </p:style>
+      </p:cxnSp>
+      <p:cxnSp>
+        <p:nvCxnSpPr>
+          <p:cNvPr id="21" name="연결선: 꺾임 20">
+            <a:extLst>
+              <a:ext uri="{FF2B5EF4-FFF2-40B4-BE49-F238E27FC236}">
+                <a16:creationId xmlns:a16="http://schemas.microsoft.com/office/drawing/2014/main" id="{E2AC2164-3847-3281-337F-D9D642FE7A88}"/>
+              </a:ext>
+            </a:extLst>
+          </p:cNvPr>
+          <p:cNvCxnSpPr>
+            <a:stCxn id="11" idx="2"/>
+            <a:endCxn id="14" idx="0"/>
+          </p:cNvCxnSpPr>
+          <p:nvPr/>
+        </p:nvCxnSpPr>
+        <p:spPr>
+          <a:xfrm rot="16200000" flipH="1">
+            <a:off x="9564414" y="4785581"/>
+            <a:ext cx="431431" cy="1322678"/>
+          </a:xfrm>
+          <a:prstGeom prst="bentConnector3">
+            <a:avLst/>
+          </a:prstGeom>
+          <a:ln>
+            <a:tailEnd type="triangle"/>
+          </a:ln>
+        </p:spPr>
+        <p:style>
+          <a:lnRef idx="1">
+            <a:schemeClr val="accent1"/>
+          </a:lnRef>
+          <a:fillRef idx="0">
+            <a:schemeClr val="accent1"/>
+          </a:fillRef>
+          <a:effectRef idx="0">
+            <a:schemeClr val="accent1"/>
+          </a:effectRef>
+          <a:fontRef idx="minor">
+            <a:schemeClr val="tx1"/>
+          </a:fontRef>
+        </p:style>
+      </p:cxnSp>
+      <p:cxnSp>
+        <p:nvCxnSpPr>
+          <p:cNvPr id="23" name="직선 화살표 연결선 22">
+            <a:extLst>
+              <a:ext uri="{FF2B5EF4-FFF2-40B4-BE49-F238E27FC236}">
+                <a16:creationId xmlns:a16="http://schemas.microsoft.com/office/drawing/2014/main" id="{32E3F593-002C-55D9-06ED-3C9E143741E6}"/>
+              </a:ext>
+            </a:extLst>
+          </p:cNvPr>
+          <p:cNvCxnSpPr>
+            <a:cxnSpLocks/>
+            <a:stCxn id="11" idx="1"/>
+            <a:endCxn id="3" idx="3"/>
+          </p:cNvCxnSpPr>
+          <p:nvPr/>
+        </p:nvCxnSpPr>
+        <p:spPr>
+          <a:xfrm flipH="1">
+            <a:off x="6007261" y="4889752"/>
+            <a:ext cx="1886950" cy="12816"/>
+          </a:xfrm>
+          <a:prstGeom prst="straightConnector1">
+            <a:avLst/>
+          </a:prstGeom>
+          <a:ln>
+            <a:solidFill>
+              <a:schemeClr val="accent2"/>
+            </a:solidFill>
+            <a:prstDash val="dashDot"/>
+            <a:tailEnd type="triangle"/>
+          </a:ln>
+        </p:spPr>
+        <p:style>
+          <a:lnRef idx="1">
+            <a:schemeClr val="accent1"/>
+          </a:lnRef>
+          <a:fillRef idx="0">
+            <a:schemeClr val="accent1"/>
+          </a:fillRef>
+          <a:effectRef idx="0">
+            <a:schemeClr val="accent1"/>
+          </a:effectRef>
+          <a:fontRef idx="minor">
+            <a:schemeClr val="tx1"/>
+          </a:fontRef>
+        </p:style>
+      </p:cxnSp>
+      <p:sp>
+        <p:nvSpPr>
+          <p:cNvPr id="26" name="타원 25">
+            <a:extLst>
+              <a:ext uri="{FF2B5EF4-FFF2-40B4-BE49-F238E27FC236}">
+                <a16:creationId xmlns:a16="http://schemas.microsoft.com/office/drawing/2014/main" id="{4131A74D-5551-F4B4-B1D3-79C85B10A37E}"/>
+              </a:ext>
+            </a:extLst>
+          </p:cNvPr>
+          <p:cNvSpPr/>
+          <p:nvPr/>
+        </p:nvSpPr>
+        <p:spPr>
+          <a:xfrm>
+            <a:off x="1233938" y="4414225"/>
+            <a:ext cx="1921398" cy="951051"/>
+          </a:xfrm>
+          <a:prstGeom prst="ellipse">
+            <a:avLst/>
+          </a:prstGeom>
+        </p:spPr>
+        <p:style>
+          <a:lnRef idx="2">
+            <a:schemeClr val="accent1">
+              <a:shade val="50000"/>
+            </a:schemeClr>
+          </a:lnRef>
+          <a:fillRef idx="1">
+            <a:schemeClr val="accent1"/>
+          </a:fillRef>
+          <a:effectRef idx="0">
+            <a:schemeClr val="accent1"/>
+          </a:effectRef>
+          <a:fontRef idx="minor">
+            <a:schemeClr val="lt1"/>
+          </a:fontRef>
+        </p:style>
+        <p:txBody>
+          <a:bodyPr rtlCol="0" anchor="ctr"/>
+          <a:lstStyle/>
+          <a:p>
+            <a:pPr algn="ctr"/>
+            <a:r>
+              <a:rPr lang="en-US" altLang="ko-KR" dirty="0"/>
+              <a:t>client</a:t>
+            </a:r>
+            <a:endParaRPr lang="ko-KR" altLang="en-US" dirty="0"/>
+          </a:p>
+        </p:txBody>
+      </p:sp>
+      <p:cxnSp>
+        <p:nvCxnSpPr>
+          <p:cNvPr id="28" name="직선 화살표 연결선 27">
+            <a:extLst>
+              <a:ext uri="{FF2B5EF4-FFF2-40B4-BE49-F238E27FC236}">
+                <a16:creationId xmlns:a16="http://schemas.microsoft.com/office/drawing/2014/main" id="{C29576FA-A570-B6DC-57EE-99340B014082}"/>
+              </a:ext>
+            </a:extLst>
+          </p:cNvPr>
+          <p:cNvCxnSpPr>
+            <a:stCxn id="26" idx="6"/>
+            <a:endCxn id="3" idx="1"/>
+          </p:cNvCxnSpPr>
+          <p:nvPr/>
+        </p:nvCxnSpPr>
+        <p:spPr>
+          <a:xfrm>
+            <a:off x="3155336" y="4889751"/>
+            <a:ext cx="402767" cy="12817"/>
+          </a:xfrm>
+          <a:prstGeom prst="straightConnector1">
+            <a:avLst/>
+          </a:prstGeom>
+          <a:ln>
+            <a:tailEnd type="triangle"/>
+          </a:ln>
+        </p:spPr>
+        <p:style>
+          <a:lnRef idx="1">
+            <a:schemeClr val="accent1"/>
+          </a:lnRef>
+          <a:fillRef idx="0">
+            <a:schemeClr val="accent1"/>
+          </a:fillRef>
+          <a:effectRef idx="0">
+            <a:schemeClr val="accent1"/>
           </a:effectRef>
           <a:fontRef idx="minor">
             <a:schemeClr val="tx1"/>

</xml_diff>

<commit_message>
composite & deco 예시 업데이트
</commit_message>
<xml_diff>
--- a/Structural_Pattern 정리.pptx
+++ b/Structural_Pattern 정리.pptx
@@ -6,6 +6,7 @@
   </p:sldMasterIdLst>
   <p:sldIdLst>
     <p:sldId id="256" r:id="rId2"/>
+    <p:sldId id="257" r:id="rId3"/>
   </p:sldIdLst>
   <p:sldSz cx="12192000" cy="6858000"/>
   <p:notesSz cx="6858000" cy="9144000"/>
@@ -304,7 +305,7 @@
           <a:p>
             <a:fld id="{AAF5C761-5613-44C6-BA4F-9AD88F585A93}" type="datetimeFigureOut">
               <a:rPr lang="ko-KR" altLang="en-US" smtClean="0"/>
-              <a:t>2023-03-17</a:t>
+              <a:t>2023-03-20</a:t>
             </a:fld>
             <a:endParaRPr lang="ko-KR" altLang="en-US"/>
           </a:p>
@@ -502,7 +503,7 @@
           <a:p>
             <a:fld id="{AAF5C761-5613-44C6-BA4F-9AD88F585A93}" type="datetimeFigureOut">
               <a:rPr lang="ko-KR" altLang="en-US" smtClean="0"/>
-              <a:t>2023-03-17</a:t>
+              <a:t>2023-03-20</a:t>
             </a:fld>
             <a:endParaRPr lang="ko-KR" altLang="en-US"/>
           </a:p>
@@ -710,7 +711,7 @@
           <a:p>
             <a:fld id="{AAF5C761-5613-44C6-BA4F-9AD88F585A93}" type="datetimeFigureOut">
               <a:rPr lang="ko-KR" altLang="en-US" smtClean="0"/>
-              <a:t>2023-03-17</a:t>
+              <a:t>2023-03-20</a:t>
             </a:fld>
             <a:endParaRPr lang="ko-KR" altLang="en-US"/>
           </a:p>
@@ -908,7 +909,7 @@
           <a:p>
             <a:fld id="{AAF5C761-5613-44C6-BA4F-9AD88F585A93}" type="datetimeFigureOut">
               <a:rPr lang="ko-KR" altLang="en-US" smtClean="0"/>
-              <a:t>2023-03-17</a:t>
+              <a:t>2023-03-20</a:t>
             </a:fld>
             <a:endParaRPr lang="ko-KR" altLang="en-US"/>
           </a:p>
@@ -1183,7 +1184,7 @@
           <a:p>
             <a:fld id="{AAF5C761-5613-44C6-BA4F-9AD88F585A93}" type="datetimeFigureOut">
               <a:rPr lang="ko-KR" altLang="en-US" smtClean="0"/>
-              <a:t>2023-03-17</a:t>
+              <a:t>2023-03-20</a:t>
             </a:fld>
             <a:endParaRPr lang="ko-KR" altLang="en-US"/>
           </a:p>
@@ -1448,7 +1449,7 @@
           <a:p>
             <a:fld id="{AAF5C761-5613-44C6-BA4F-9AD88F585A93}" type="datetimeFigureOut">
               <a:rPr lang="ko-KR" altLang="en-US" smtClean="0"/>
-              <a:t>2023-03-17</a:t>
+              <a:t>2023-03-20</a:t>
             </a:fld>
             <a:endParaRPr lang="ko-KR" altLang="en-US"/>
           </a:p>
@@ -1860,7 +1861,7 @@
           <a:p>
             <a:fld id="{AAF5C761-5613-44C6-BA4F-9AD88F585A93}" type="datetimeFigureOut">
               <a:rPr lang="ko-KR" altLang="en-US" smtClean="0"/>
-              <a:t>2023-03-17</a:t>
+              <a:t>2023-03-20</a:t>
             </a:fld>
             <a:endParaRPr lang="ko-KR" altLang="en-US"/>
           </a:p>
@@ -2001,7 +2002,7 @@
           <a:p>
             <a:fld id="{AAF5C761-5613-44C6-BA4F-9AD88F585A93}" type="datetimeFigureOut">
               <a:rPr lang="ko-KR" altLang="en-US" smtClean="0"/>
-              <a:t>2023-03-17</a:t>
+              <a:t>2023-03-20</a:t>
             </a:fld>
             <a:endParaRPr lang="ko-KR" altLang="en-US"/>
           </a:p>
@@ -2114,7 +2115,7 @@
           <a:p>
             <a:fld id="{AAF5C761-5613-44C6-BA4F-9AD88F585A93}" type="datetimeFigureOut">
               <a:rPr lang="ko-KR" altLang="en-US" smtClean="0"/>
-              <a:t>2023-03-17</a:t>
+              <a:t>2023-03-20</a:t>
             </a:fld>
             <a:endParaRPr lang="ko-KR" altLang="en-US"/>
           </a:p>
@@ -2425,7 +2426,7 @@
           <a:p>
             <a:fld id="{AAF5C761-5613-44C6-BA4F-9AD88F585A93}" type="datetimeFigureOut">
               <a:rPr lang="ko-KR" altLang="en-US" smtClean="0"/>
-              <a:t>2023-03-17</a:t>
+              <a:t>2023-03-20</a:t>
             </a:fld>
             <a:endParaRPr lang="ko-KR" altLang="en-US"/>
           </a:p>
@@ -2713,7 +2714,7 @@
           <a:p>
             <a:fld id="{AAF5C761-5613-44C6-BA4F-9AD88F585A93}" type="datetimeFigureOut">
               <a:rPr lang="ko-KR" altLang="en-US" smtClean="0"/>
-              <a:t>2023-03-17</a:t>
+              <a:t>2023-03-20</a:t>
             </a:fld>
             <a:endParaRPr lang="ko-KR" altLang="en-US"/>
           </a:p>
@@ -2954,7 +2955,7 @@
           <a:p>
             <a:fld id="{AAF5C761-5613-44C6-BA4F-9AD88F585A93}" type="datetimeFigureOut">
               <a:rPr lang="ko-KR" altLang="en-US" smtClean="0"/>
-              <a:t>2023-03-17</a:t>
+              <a:t>2023-03-20</a:t>
             </a:fld>
             <a:endParaRPr lang="ko-KR" altLang="en-US"/>
           </a:p>
@@ -3765,7 +3766,7 @@
         </p:nvSpPr>
         <p:spPr>
           <a:xfrm>
-            <a:off x="1088020" y="3809149"/>
+            <a:off x="1088020" y="3831315"/>
             <a:ext cx="1762021" cy="369332"/>
           </a:xfrm>
           <a:prstGeom prst="rect">
@@ -4321,6 +4322,1257 @@
       <p188:commentRel xmlns:p188="http://schemas.microsoft.com/office/powerpoint/2018/8/main" r:id="rId2"/>
     </p:ext>
   </p:extLst>
+</p:sld>
+</file>
+
+<file path=ppt/slides/slide2.xml><?xml version="1.0" encoding="utf-8"?>
+<p:sld xmlns:a="http://schemas.openxmlformats.org/drawingml/2006/main" xmlns:r="http://schemas.openxmlformats.org/officeDocument/2006/relationships" xmlns:p="http://schemas.openxmlformats.org/presentationml/2006/main">
+  <p:cSld>
+    <p:spTree>
+      <p:nvGrpSpPr>
+        <p:cNvPr id="1" name=""/>
+        <p:cNvGrpSpPr/>
+        <p:nvPr/>
+      </p:nvGrpSpPr>
+      <p:grpSpPr>
+        <a:xfrm>
+          <a:off x="0" y="0"/>
+          <a:ext cx="0" cy="0"/>
+          <a:chOff x="0" y="0"/>
+          <a:chExt cx="0" cy="0"/>
+        </a:xfrm>
+      </p:grpSpPr>
+      <p:sp>
+        <p:nvSpPr>
+          <p:cNvPr id="2" name="TextBox 1">
+            <a:extLst>
+              <a:ext uri="{FF2B5EF4-FFF2-40B4-BE49-F238E27FC236}">
+                <a16:creationId xmlns:a16="http://schemas.microsoft.com/office/drawing/2014/main" id="{F73F30B6-0610-FC7C-EAE5-0BC64FE95EF9}"/>
+              </a:ext>
+            </a:extLst>
+          </p:cNvPr>
+          <p:cNvSpPr txBox="1"/>
+          <p:nvPr/>
+        </p:nvSpPr>
+        <p:spPr>
+          <a:xfrm>
+            <a:off x="1088020" y="821803"/>
+            <a:ext cx="2504147" cy="369332"/>
+          </a:xfrm>
+          <a:prstGeom prst="rect">
+            <a:avLst/>
+          </a:prstGeom>
+          <a:noFill/>
+        </p:spPr>
+        <p:txBody>
+          <a:bodyPr wrap="none" rtlCol="0">
+            <a:spAutoFit/>
+          </a:bodyPr>
+          <a:lstStyle/>
+          <a:p>
+            <a:r>
+              <a:rPr lang="ko-KR" altLang="en-US" dirty="0"/>
+              <a:t>복합체 </a:t>
+            </a:r>
+            <a:r>
+              <a:rPr lang="en-US" altLang="ko-KR" dirty="0"/>
+              <a:t>(COMPOSITE)</a:t>
+            </a:r>
+            <a:r>
+              <a:rPr lang="ko-KR" altLang="en-US" dirty="0"/>
+              <a:t> </a:t>
+            </a:r>
+            <a:r>
+              <a:rPr lang="en-US" altLang="ko-KR" dirty="0"/>
+              <a:t>:</a:t>
+            </a:r>
+            <a:endParaRPr lang="ko-KR" altLang="en-US" dirty="0"/>
+          </a:p>
+        </p:txBody>
+      </p:sp>
+      <p:sp>
+        <p:nvSpPr>
+          <p:cNvPr id="3" name="직사각형 2">
+            <a:extLst>
+              <a:ext uri="{FF2B5EF4-FFF2-40B4-BE49-F238E27FC236}">
+                <a16:creationId xmlns:a16="http://schemas.microsoft.com/office/drawing/2014/main" id="{7B8AFA6E-33AA-5807-15EF-4CD70A889382}"/>
+              </a:ext>
+            </a:extLst>
+          </p:cNvPr>
+          <p:cNvSpPr/>
+          <p:nvPr/>
+        </p:nvSpPr>
+        <p:spPr>
+          <a:xfrm>
+            <a:off x="6200775" y="457200"/>
+            <a:ext cx="1485900" cy="457200"/>
+          </a:xfrm>
+          <a:prstGeom prst="rect">
+            <a:avLst/>
+          </a:prstGeom>
+        </p:spPr>
+        <p:style>
+          <a:lnRef idx="2">
+            <a:schemeClr val="accent1">
+              <a:shade val="50000"/>
+            </a:schemeClr>
+          </a:lnRef>
+          <a:fillRef idx="1">
+            <a:schemeClr val="accent1"/>
+          </a:fillRef>
+          <a:effectRef idx="0">
+            <a:schemeClr val="accent1"/>
+          </a:effectRef>
+          <a:fontRef idx="minor">
+            <a:schemeClr val="lt1"/>
+          </a:fontRef>
+        </p:style>
+        <p:txBody>
+          <a:bodyPr rtlCol="0" anchor="ctr"/>
+          <a:lstStyle/>
+          <a:p>
+            <a:pPr algn="ctr"/>
+            <a:r>
+              <a:rPr lang="en-US" altLang="ko-KR" dirty="0"/>
+              <a:t>composite</a:t>
+            </a:r>
+            <a:endParaRPr lang="ko-KR" altLang="en-US" dirty="0"/>
+          </a:p>
+        </p:txBody>
+      </p:sp>
+      <p:sp>
+        <p:nvSpPr>
+          <p:cNvPr id="4" name="직사각형 3">
+            <a:extLst>
+              <a:ext uri="{FF2B5EF4-FFF2-40B4-BE49-F238E27FC236}">
+                <a16:creationId xmlns:a16="http://schemas.microsoft.com/office/drawing/2014/main" id="{4747C15D-35E9-7D72-152C-2818D291ED86}"/>
+              </a:ext>
+            </a:extLst>
+          </p:cNvPr>
+          <p:cNvSpPr/>
+          <p:nvPr/>
+        </p:nvSpPr>
+        <p:spPr>
+          <a:xfrm>
+            <a:off x="6943725" y="1485900"/>
+            <a:ext cx="1485900" cy="457200"/>
+          </a:xfrm>
+          <a:prstGeom prst="rect">
+            <a:avLst/>
+          </a:prstGeom>
+        </p:spPr>
+        <p:style>
+          <a:lnRef idx="2">
+            <a:schemeClr val="accent1">
+              <a:shade val="50000"/>
+            </a:schemeClr>
+          </a:lnRef>
+          <a:fillRef idx="1">
+            <a:schemeClr val="accent1"/>
+          </a:fillRef>
+          <a:effectRef idx="0">
+            <a:schemeClr val="accent1"/>
+          </a:effectRef>
+          <a:fontRef idx="minor">
+            <a:schemeClr val="lt1"/>
+          </a:fontRef>
+        </p:style>
+        <p:txBody>
+          <a:bodyPr rtlCol="0" anchor="ctr"/>
+          <a:lstStyle/>
+          <a:p>
+            <a:pPr algn="ctr"/>
+            <a:r>
+              <a:rPr lang="en-US" altLang="ko-KR" dirty="0"/>
+              <a:t>composite</a:t>
+            </a:r>
+            <a:endParaRPr lang="ko-KR" altLang="en-US" dirty="0"/>
+          </a:p>
+        </p:txBody>
+      </p:sp>
+      <p:sp>
+        <p:nvSpPr>
+          <p:cNvPr id="5" name="직사각형 4">
+            <a:extLst>
+              <a:ext uri="{FF2B5EF4-FFF2-40B4-BE49-F238E27FC236}">
+                <a16:creationId xmlns:a16="http://schemas.microsoft.com/office/drawing/2014/main" id="{9CF81887-70D8-B9AA-0C91-DE017E08690F}"/>
+              </a:ext>
+            </a:extLst>
+          </p:cNvPr>
+          <p:cNvSpPr/>
+          <p:nvPr/>
+        </p:nvSpPr>
+        <p:spPr>
+          <a:xfrm>
+            <a:off x="4387968" y="1485900"/>
+            <a:ext cx="914400" cy="457200"/>
+          </a:xfrm>
+          <a:prstGeom prst="rect">
+            <a:avLst/>
+          </a:prstGeom>
+        </p:spPr>
+        <p:style>
+          <a:lnRef idx="2">
+            <a:schemeClr val="accent1">
+              <a:shade val="50000"/>
+            </a:schemeClr>
+          </a:lnRef>
+          <a:fillRef idx="1">
+            <a:schemeClr val="accent1"/>
+          </a:fillRef>
+          <a:effectRef idx="0">
+            <a:schemeClr val="accent1"/>
+          </a:effectRef>
+          <a:fontRef idx="minor">
+            <a:schemeClr val="lt1"/>
+          </a:fontRef>
+        </p:style>
+        <p:txBody>
+          <a:bodyPr rtlCol="0" anchor="ctr"/>
+          <a:lstStyle/>
+          <a:p>
+            <a:pPr algn="ctr"/>
+            <a:r>
+              <a:rPr lang="en-US" altLang="ko-KR" dirty="0"/>
+              <a:t>Leaf</a:t>
+            </a:r>
+            <a:endParaRPr lang="ko-KR" altLang="en-US" dirty="0"/>
+          </a:p>
+        </p:txBody>
+      </p:sp>
+      <p:sp>
+        <p:nvSpPr>
+          <p:cNvPr id="6" name="직사각형 5">
+            <a:extLst>
+              <a:ext uri="{FF2B5EF4-FFF2-40B4-BE49-F238E27FC236}">
+                <a16:creationId xmlns:a16="http://schemas.microsoft.com/office/drawing/2014/main" id="{129657D2-AE05-9DB9-E881-AD936E4AA8DA}"/>
+              </a:ext>
+            </a:extLst>
+          </p:cNvPr>
+          <p:cNvSpPr/>
+          <p:nvPr/>
+        </p:nvSpPr>
+        <p:spPr>
+          <a:xfrm>
+            <a:off x="5665846" y="1485900"/>
+            <a:ext cx="914400" cy="457200"/>
+          </a:xfrm>
+          <a:prstGeom prst="rect">
+            <a:avLst/>
+          </a:prstGeom>
+        </p:spPr>
+        <p:style>
+          <a:lnRef idx="2">
+            <a:schemeClr val="accent1">
+              <a:shade val="50000"/>
+            </a:schemeClr>
+          </a:lnRef>
+          <a:fillRef idx="1">
+            <a:schemeClr val="accent1"/>
+          </a:fillRef>
+          <a:effectRef idx="0">
+            <a:schemeClr val="accent1"/>
+          </a:effectRef>
+          <a:fontRef idx="minor">
+            <a:schemeClr val="lt1"/>
+          </a:fontRef>
+        </p:style>
+        <p:txBody>
+          <a:bodyPr rtlCol="0" anchor="ctr"/>
+          <a:lstStyle/>
+          <a:p>
+            <a:pPr algn="ctr"/>
+            <a:r>
+              <a:rPr lang="en-US" altLang="ko-KR" dirty="0"/>
+              <a:t>Leaf</a:t>
+            </a:r>
+            <a:endParaRPr lang="ko-KR" altLang="en-US" dirty="0"/>
+          </a:p>
+        </p:txBody>
+      </p:sp>
+      <p:sp>
+        <p:nvSpPr>
+          <p:cNvPr id="7" name="직사각형 6">
+            <a:extLst>
+              <a:ext uri="{FF2B5EF4-FFF2-40B4-BE49-F238E27FC236}">
+                <a16:creationId xmlns:a16="http://schemas.microsoft.com/office/drawing/2014/main" id="{C4DAC4D6-3279-31C8-0F9B-7A29A87F753D}"/>
+              </a:ext>
+            </a:extLst>
+          </p:cNvPr>
+          <p:cNvSpPr/>
+          <p:nvPr/>
+        </p:nvSpPr>
+        <p:spPr>
+          <a:xfrm>
+            <a:off x="8793104" y="1485900"/>
+            <a:ext cx="914400" cy="457200"/>
+          </a:xfrm>
+          <a:prstGeom prst="rect">
+            <a:avLst/>
+          </a:prstGeom>
+        </p:spPr>
+        <p:style>
+          <a:lnRef idx="2">
+            <a:schemeClr val="accent1">
+              <a:shade val="50000"/>
+            </a:schemeClr>
+          </a:lnRef>
+          <a:fillRef idx="1">
+            <a:schemeClr val="accent1"/>
+          </a:fillRef>
+          <a:effectRef idx="0">
+            <a:schemeClr val="accent1"/>
+          </a:effectRef>
+          <a:fontRef idx="minor">
+            <a:schemeClr val="lt1"/>
+          </a:fontRef>
+        </p:style>
+        <p:txBody>
+          <a:bodyPr rtlCol="0" anchor="ctr"/>
+          <a:lstStyle/>
+          <a:p>
+            <a:pPr algn="ctr"/>
+            <a:r>
+              <a:rPr lang="en-US" altLang="ko-KR" dirty="0"/>
+              <a:t>Leaf</a:t>
+            </a:r>
+            <a:endParaRPr lang="ko-KR" altLang="en-US" dirty="0"/>
+          </a:p>
+        </p:txBody>
+      </p:sp>
+      <p:sp>
+        <p:nvSpPr>
+          <p:cNvPr id="8" name="직사각형 7">
+            <a:extLst>
+              <a:ext uri="{FF2B5EF4-FFF2-40B4-BE49-F238E27FC236}">
+                <a16:creationId xmlns:a16="http://schemas.microsoft.com/office/drawing/2014/main" id="{61D9B557-CDE3-3337-500D-9A9847D0A584}"/>
+              </a:ext>
+            </a:extLst>
+          </p:cNvPr>
+          <p:cNvSpPr/>
+          <p:nvPr/>
+        </p:nvSpPr>
+        <p:spPr>
+          <a:xfrm>
+            <a:off x="6026268" y="2514600"/>
+            <a:ext cx="914400" cy="457200"/>
+          </a:xfrm>
+          <a:prstGeom prst="rect">
+            <a:avLst/>
+          </a:prstGeom>
+        </p:spPr>
+        <p:style>
+          <a:lnRef idx="2">
+            <a:schemeClr val="accent1">
+              <a:shade val="50000"/>
+            </a:schemeClr>
+          </a:lnRef>
+          <a:fillRef idx="1">
+            <a:schemeClr val="accent1"/>
+          </a:fillRef>
+          <a:effectRef idx="0">
+            <a:schemeClr val="accent1"/>
+          </a:effectRef>
+          <a:fontRef idx="minor">
+            <a:schemeClr val="lt1"/>
+          </a:fontRef>
+        </p:style>
+        <p:txBody>
+          <a:bodyPr rtlCol="0" anchor="ctr"/>
+          <a:lstStyle/>
+          <a:p>
+            <a:pPr algn="ctr"/>
+            <a:r>
+              <a:rPr lang="en-US" altLang="ko-KR" dirty="0"/>
+              <a:t>Leaf</a:t>
+            </a:r>
+            <a:endParaRPr lang="ko-KR" altLang="en-US" dirty="0"/>
+          </a:p>
+        </p:txBody>
+      </p:sp>
+      <p:sp>
+        <p:nvSpPr>
+          <p:cNvPr id="9" name="직사각형 8">
+            <a:extLst>
+              <a:ext uri="{FF2B5EF4-FFF2-40B4-BE49-F238E27FC236}">
+                <a16:creationId xmlns:a16="http://schemas.microsoft.com/office/drawing/2014/main" id="{E9126730-D77D-9DF0-00C3-F9AD8772AE6D}"/>
+              </a:ext>
+            </a:extLst>
+          </p:cNvPr>
+          <p:cNvSpPr/>
+          <p:nvPr/>
+        </p:nvSpPr>
+        <p:spPr>
+          <a:xfrm>
+            <a:off x="7246996" y="2514600"/>
+            <a:ext cx="914400" cy="457200"/>
+          </a:xfrm>
+          <a:prstGeom prst="rect">
+            <a:avLst/>
+          </a:prstGeom>
+        </p:spPr>
+        <p:style>
+          <a:lnRef idx="2">
+            <a:schemeClr val="accent1">
+              <a:shade val="50000"/>
+            </a:schemeClr>
+          </a:lnRef>
+          <a:fillRef idx="1">
+            <a:schemeClr val="accent1"/>
+          </a:fillRef>
+          <a:effectRef idx="0">
+            <a:schemeClr val="accent1"/>
+          </a:effectRef>
+          <a:fontRef idx="minor">
+            <a:schemeClr val="lt1"/>
+          </a:fontRef>
+        </p:style>
+        <p:txBody>
+          <a:bodyPr rtlCol="0" anchor="ctr"/>
+          <a:lstStyle/>
+          <a:p>
+            <a:pPr algn="ctr"/>
+            <a:r>
+              <a:rPr lang="en-US" altLang="ko-KR" dirty="0"/>
+              <a:t>Leaf</a:t>
+            </a:r>
+            <a:endParaRPr lang="ko-KR" altLang="en-US" dirty="0"/>
+          </a:p>
+        </p:txBody>
+      </p:sp>
+      <p:sp>
+        <p:nvSpPr>
+          <p:cNvPr id="10" name="직사각형 9">
+            <a:extLst>
+              <a:ext uri="{FF2B5EF4-FFF2-40B4-BE49-F238E27FC236}">
+                <a16:creationId xmlns:a16="http://schemas.microsoft.com/office/drawing/2014/main" id="{8F6266D3-C1D1-C4AB-EB65-9E047C48DF28}"/>
+              </a:ext>
+            </a:extLst>
+          </p:cNvPr>
+          <p:cNvSpPr/>
+          <p:nvPr/>
+        </p:nvSpPr>
+        <p:spPr>
+          <a:xfrm>
+            <a:off x="8477252" y="2514600"/>
+            <a:ext cx="914400" cy="457200"/>
+          </a:xfrm>
+          <a:prstGeom prst="rect">
+            <a:avLst/>
+          </a:prstGeom>
+        </p:spPr>
+        <p:style>
+          <a:lnRef idx="2">
+            <a:schemeClr val="accent1">
+              <a:shade val="50000"/>
+            </a:schemeClr>
+          </a:lnRef>
+          <a:fillRef idx="1">
+            <a:schemeClr val="accent1"/>
+          </a:fillRef>
+          <a:effectRef idx="0">
+            <a:schemeClr val="accent1"/>
+          </a:effectRef>
+          <a:fontRef idx="minor">
+            <a:schemeClr val="lt1"/>
+          </a:fontRef>
+        </p:style>
+        <p:txBody>
+          <a:bodyPr rtlCol="0" anchor="ctr"/>
+          <a:lstStyle/>
+          <a:p>
+            <a:pPr algn="ctr"/>
+            <a:r>
+              <a:rPr lang="en-US" altLang="ko-KR" dirty="0"/>
+              <a:t>Leaf</a:t>
+            </a:r>
+            <a:endParaRPr lang="ko-KR" altLang="en-US" dirty="0"/>
+          </a:p>
+        </p:txBody>
+      </p:sp>
+      <p:cxnSp>
+        <p:nvCxnSpPr>
+          <p:cNvPr id="12" name="연결선: 꺾임 11">
+            <a:extLst>
+              <a:ext uri="{FF2B5EF4-FFF2-40B4-BE49-F238E27FC236}">
+                <a16:creationId xmlns:a16="http://schemas.microsoft.com/office/drawing/2014/main" id="{8C20DDE9-A789-B539-D0C7-7CE5F17C0C5E}"/>
+              </a:ext>
+            </a:extLst>
+          </p:cNvPr>
+          <p:cNvCxnSpPr>
+            <a:stCxn id="3" idx="2"/>
+            <a:endCxn id="5" idx="0"/>
+          </p:cNvCxnSpPr>
+          <p:nvPr/>
+        </p:nvCxnSpPr>
+        <p:spPr>
+          <a:xfrm rot="5400000">
+            <a:off x="5608697" y="150872"/>
+            <a:ext cx="571500" cy="2098557"/>
+          </a:xfrm>
+          <a:prstGeom prst="bentConnector3">
+            <a:avLst/>
+          </a:prstGeom>
+          <a:ln>
+            <a:tailEnd type="triangle"/>
+          </a:ln>
+        </p:spPr>
+        <p:style>
+          <a:lnRef idx="1">
+            <a:schemeClr val="accent1"/>
+          </a:lnRef>
+          <a:fillRef idx="0">
+            <a:schemeClr val="accent1"/>
+          </a:fillRef>
+          <a:effectRef idx="0">
+            <a:schemeClr val="accent1"/>
+          </a:effectRef>
+          <a:fontRef idx="minor">
+            <a:schemeClr val="tx1"/>
+          </a:fontRef>
+        </p:style>
+      </p:cxnSp>
+      <p:cxnSp>
+        <p:nvCxnSpPr>
+          <p:cNvPr id="14" name="연결선: 꺾임 13">
+            <a:extLst>
+              <a:ext uri="{FF2B5EF4-FFF2-40B4-BE49-F238E27FC236}">
+                <a16:creationId xmlns:a16="http://schemas.microsoft.com/office/drawing/2014/main" id="{86ECD715-30CF-F166-F0AA-97B78FC18855}"/>
+              </a:ext>
+            </a:extLst>
+          </p:cNvPr>
+          <p:cNvCxnSpPr>
+            <a:stCxn id="3" idx="2"/>
+            <a:endCxn id="6" idx="0"/>
+          </p:cNvCxnSpPr>
+          <p:nvPr/>
+        </p:nvCxnSpPr>
+        <p:spPr>
+          <a:xfrm rot="5400000">
+            <a:off x="6247636" y="789811"/>
+            <a:ext cx="571500" cy="820679"/>
+          </a:xfrm>
+          <a:prstGeom prst="bentConnector3">
+            <a:avLst/>
+          </a:prstGeom>
+          <a:ln>
+            <a:tailEnd type="triangle"/>
+          </a:ln>
+        </p:spPr>
+        <p:style>
+          <a:lnRef idx="1">
+            <a:schemeClr val="accent1"/>
+          </a:lnRef>
+          <a:fillRef idx="0">
+            <a:schemeClr val="accent1"/>
+          </a:fillRef>
+          <a:effectRef idx="0">
+            <a:schemeClr val="accent1"/>
+          </a:effectRef>
+          <a:fontRef idx="minor">
+            <a:schemeClr val="tx1"/>
+          </a:fontRef>
+        </p:style>
+      </p:cxnSp>
+      <p:cxnSp>
+        <p:nvCxnSpPr>
+          <p:cNvPr id="16" name="연결선: 꺾임 15">
+            <a:extLst>
+              <a:ext uri="{FF2B5EF4-FFF2-40B4-BE49-F238E27FC236}">
+                <a16:creationId xmlns:a16="http://schemas.microsoft.com/office/drawing/2014/main" id="{5A8EA65B-B6C3-B420-84D9-D1CADEC621E0}"/>
+              </a:ext>
+            </a:extLst>
+          </p:cNvPr>
+          <p:cNvCxnSpPr>
+            <a:stCxn id="3" idx="2"/>
+            <a:endCxn id="4" idx="0"/>
+          </p:cNvCxnSpPr>
+          <p:nvPr/>
+        </p:nvCxnSpPr>
+        <p:spPr>
+          <a:xfrm rot="16200000" flipH="1">
+            <a:off x="7029450" y="828675"/>
+            <a:ext cx="571500" cy="742950"/>
+          </a:xfrm>
+          <a:prstGeom prst="bentConnector3">
+            <a:avLst/>
+          </a:prstGeom>
+          <a:ln>
+            <a:tailEnd type="triangle"/>
+          </a:ln>
+        </p:spPr>
+        <p:style>
+          <a:lnRef idx="1">
+            <a:schemeClr val="accent1"/>
+          </a:lnRef>
+          <a:fillRef idx="0">
+            <a:schemeClr val="accent1"/>
+          </a:fillRef>
+          <a:effectRef idx="0">
+            <a:schemeClr val="accent1"/>
+          </a:effectRef>
+          <a:fontRef idx="minor">
+            <a:schemeClr val="tx1"/>
+          </a:fontRef>
+        </p:style>
+      </p:cxnSp>
+      <p:cxnSp>
+        <p:nvCxnSpPr>
+          <p:cNvPr id="18" name="연결선: 꺾임 17">
+            <a:extLst>
+              <a:ext uri="{FF2B5EF4-FFF2-40B4-BE49-F238E27FC236}">
+                <a16:creationId xmlns:a16="http://schemas.microsoft.com/office/drawing/2014/main" id="{C3D211BA-A1F1-9E6D-AAAB-61336A02BCE1}"/>
+              </a:ext>
+            </a:extLst>
+          </p:cNvPr>
+          <p:cNvCxnSpPr>
+            <a:stCxn id="3" idx="2"/>
+            <a:endCxn id="7" idx="0"/>
+          </p:cNvCxnSpPr>
+          <p:nvPr/>
+        </p:nvCxnSpPr>
+        <p:spPr>
+          <a:xfrm rot="16200000" flipH="1">
+            <a:off x="7811264" y="46860"/>
+            <a:ext cx="571500" cy="2306579"/>
+          </a:xfrm>
+          <a:prstGeom prst="bentConnector3">
+            <a:avLst/>
+          </a:prstGeom>
+          <a:ln>
+            <a:tailEnd type="triangle"/>
+          </a:ln>
+        </p:spPr>
+        <p:style>
+          <a:lnRef idx="1">
+            <a:schemeClr val="accent1"/>
+          </a:lnRef>
+          <a:fillRef idx="0">
+            <a:schemeClr val="accent1"/>
+          </a:fillRef>
+          <a:effectRef idx="0">
+            <a:schemeClr val="accent1"/>
+          </a:effectRef>
+          <a:fontRef idx="minor">
+            <a:schemeClr val="tx1"/>
+          </a:fontRef>
+        </p:style>
+      </p:cxnSp>
+      <p:cxnSp>
+        <p:nvCxnSpPr>
+          <p:cNvPr id="20" name="연결선: 꺾임 19">
+            <a:extLst>
+              <a:ext uri="{FF2B5EF4-FFF2-40B4-BE49-F238E27FC236}">
+                <a16:creationId xmlns:a16="http://schemas.microsoft.com/office/drawing/2014/main" id="{8C6AD89A-DA64-311C-D6FC-A4260DEB2FC0}"/>
+              </a:ext>
+            </a:extLst>
+          </p:cNvPr>
+          <p:cNvCxnSpPr>
+            <a:stCxn id="4" idx="2"/>
+            <a:endCxn id="8" idx="0"/>
+          </p:cNvCxnSpPr>
+          <p:nvPr/>
+        </p:nvCxnSpPr>
+        <p:spPr>
+          <a:xfrm rot="5400000">
+            <a:off x="6799322" y="1627247"/>
+            <a:ext cx="571500" cy="1203207"/>
+          </a:xfrm>
+          <a:prstGeom prst="bentConnector3">
+            <a:avLst/>
+          </a:prstGeom>
+          <a:ln>
+            <a:tailEnd type="triangle"/>
+          </a:ln>
+        </p:spPr>
+        <p:style>
+          <a:lnRef idx="1">
+            <a:schemeClr val="accent1"/>
+          </a:lnRef>
+          <a:fillRef idx="0">
+            <a:schemeClr val="accent1"/>
+          </a:fillRef>
+          <a:effectRef idx="0">
+            <a:schemeClr val="accent1"/>
+          </a:effectRef>
+          <a:fontRef idx="minor">
+            <a:schemeClr val="tx1"/>
+          </a:fontRef>
+        </p:style>
+      </p:cxnSp>
+      <p:cxnSp>
+        <p:nvCxnSpPr>
+          <p:cNvPr id="22" name="직선 화살표 연결선 21">
+            <a:extLst>
+              <a:ext uri="{FF2B5EF4-FFF2-40B4-BE49-F238E27FC236}">
+                <a16:creationId xmlns:a16="http://schemas.microsoft.com/office/drawing/2014/main" id="{F5F70540-A9B5-461F-4561-07761B353B0F}"/>
+              </a:ext>
+            </a:extLst>
+          </p:cNvPr>
+          <p:cNvCxnSpPr>
+            <a:cxnSpLocks/>
+            <a:stCxn id="4" idx="2"/>
+            <a:endCxn id="9" idx="0"/>
+          </p:cNvCxnSpPr>
+          <p:nvPr/>
+        </p:nvCxnSpPr>
+        <p:spPr>
+          <a:xfrm>
+            <a:off x="7686675" y="1943100"/>
+            <a:ext cx="17521" cy="571500"/>
+          </a:xfrm>
+          <a:prstGeom prst="straightConnector1">
+            <a:avLst/>
+          </a:prstGeom>
+          <a:ln>
+            <a:tailEnd type="triangle"/>
+          </a:ln>
+        </p:spPr>
+        <p:style>
+          <a:lnRef idx="1">
+            <a:schemeClr val="accent1"/>
+          </a:lnRef>
+          <a:fillRef idx="0">
+            <a:schemeClr val="accent1"/>
+          </a:fillRef>
+          <a:effectRef idx="0">
+            <a:schemeClr val="accent1"/>
+          </a:effectRef>
+          <a:fontRef idx="minor">
+            <a:schemeClr val="tx1"/>
+          </a:fontRef>
+        </p:style>
+      </p:cxnSp>
+      <p:cxnSp>
+        <p:nvCxnSpPr>
+          <p:cNvPr id="27" name="연결선: 꺾임 26">
+            <a:extLst>
+              <a:ext uri="{FF2B5EF4-FFF2-40B4-BE49-F238E27FC236}">
+                <a16:creationId xmlns:a16="http://schemas.microsoft.com/office/drawing/2014/main" id="{4550AA4F-BA3E-71B3-8559-F73E6D366FD6}"/>
+              </a:ext>
+            </a:extLst>
+          </p:cNvPr>
+          <p:cNvCxnSpPr>
+            <a:stCxn id="4" idx="2"/>
+            <a:endCxn id="10" idx="0"/>
+          </p:cNvCxnSpPr>
+          <p:nvPr/>
+        </p:nvCxnSpPr>
+        <p:spPr>
+          <a:xfrm rot="16200000" flipH="1">
+            <a:off x="8024813" y="1604961"/>
+            <a:ext cx="571500" cy="1247777"/>
+          </a:xfrm>
+          <a:prstGeom prst="bentConnector3">
+            <a:avLst/>
+          </a:prstGeom>
+          <a:ln>
+            <a:tailEnd type="triangle"/>
+          </a:ln>
+        </p:spPr>
+        <p:style>
+          <a:lnRef idx="1">
+            <a:schemeClr val="accent1"/>
+          </a:lnRef>
+          <a:fillRef idx="0">
+            <a:schemeClr val="accent1"/>
+          </a:fillRef>
+          <a:effectRef idx="0">
+            <a:schemeClr val="accent1"/>
+          </a:effectRef>
+          <a:fontRef idx="minor">
+            <a:schemeClr val="tx1"/>
+          </a:fontRef>
+        </p:style>
+      </p:cxnSp>
+      <p:sp>
+        <p:nvSpPr>
+          <p:cNvPr id="28" name="TextBox 27">
+            <a:extLst>
+              <a:ext uri="{FF2B5EF4-FFF2-40B4-BE49-F238E27FC236}">
+                <a16:creationId xmlns:a16="http://schemas.microsoft.com/office/drawing/2014/main" id="{FD9D8EC9-6456-01F1-638E-DE48E7AC0199}"/>
+              </a:ext>
+            </a:extLst>
+          </p:cNvPr>
+          <p:cNvSpPr txBox="1"/>
+          <p:nvPr/>
+        </p:nvSpPr>
+        <p:spPr>
+          <a:xfrm>
+            <a:off x="1088020" y="3244334"/>
+            <a:ext cx="3249351" cy="369332"/>
+          </a:xfrm>
+          <a:prstGeom prst="rect">
+            <a:avLst/>
+          </a:prstGeom>
+          <a:noFill/>
+        </p:spPr>
+        <p:txBody>
+          <a:bodyPr wrap="none" rtlCol="0">
+            <a:spAutoFit/>
+          </a:bodyPr>
+          <a:lstStyle/>
+          <a:p>
+            <a:r>
+              <a:rPr lang="ko-KR" altLang="en-US" dirty="0" err="1"/>
+              <a:t>장식자</a:t>
+            </a:r>
+            <a:r>
+              <a:rPr lang="ko-KR" altLang="en-US" dirty="0"/>
+              <a:t> </a:t>
+            </a:r>
+            <a:r>
+              <a:rPr lang="en-US" altLang="ko-KR" dirty="0"/>
+              <a:t>(DECORATOR)</a:t>
+            </a:r>
+            <a:r>
+              <a:rPr lang="ko-KR" altLang="en-US" dirty="0"/>
+              <a:t> </a:t>
+            </a:r>
+            <a:r>
+              <a:rPr lang="en-US" altLang="ko-KR" dirty="0"/>
+              <a:t>: </a:t>
+            </a:r>
+            <a:r>
+              <a:rPr lang="ko-KR" altLang="en-US" dirty="0"/>
+              <a:t>예시</a:t>
+            </a:r>
+            <a:r>
+              <a:rPr lang="en-US" altLang="ko-KR" dirty="0"/>
+              <a:t>&gt;</a:t>
+            </a:r>
+            <a:endParaRPr lang="ko-KR" altLang="en-US" dirty="0"/>
+          </a:p>
+        </p:txBody>
+      </p:sp>
+      <p:sp>
+        <p:nvSpPr>
+          <p:cNvPr id="33" name="직사각형 32">
+            <a:extLst>
+              <a:ext uri="{FF2B5EF4-FFF2-40B4-BE49-F238E27FC236}">
+                <a16:creationId xmlns:a16="http://schemas.microsoft.com/office/drawing/2014/main" id="{0A5564D0-3124-6423-BFD7-59D16C7A2BD0}"/>
+              </a:ext>
+            </a:extLst>
+          </p:cNvPr>
+          <p:cNvSpPr/>
+          <p:nvPr/>
+        </p:nvSpPr>
+        <p:spPr>
+          <a:xfrm>
+            <a:off x="5151497" y="3409950"/>
+            <a:ext cx="1485900" cy="457200"/>
+          </a:xfrm>
+          <a:prstGeom prst="rect">
+            <a:avLst/>
+          </a:prstGeom>
+        </p:spPr>
+        <p:style>
+          <a:lnRef idx="2">
+            <a:schemeClr val="accent1">
+              <a:shade val="50000"/>
+            </a:schemeClr>
+          </a:lnRef>
+          <a:fillRef idx="1">
+            <a:schemeClr val="accent1"/>
+          </a:fillRef>
+          <a:effectRef idx="0">
+            <a:schemeClr val="accent1"/>
+          </a:effectRef>
+          <a:fontRef idx="minor">
+            <a:schemeClr val="lt1"/>
+          </a:fontRef>
+        </p:style>
+        <p:txBody>
+          <a:bodyPr rtlCol="0" anchor="ctr"/>
+          <a:lstStyle/>
+          <a:p>
+            <a:pPr algn="ctr"/>
+            <a:r>
+              <a:rPr lang="en-US" altLang="ko-KR" dirty="0"/>
+              <a:t>component</a:t>
+            </a:r>
+            <a:endParaRPr lang="ko-KR" altLang="en-US" dirty="0"/>
+          </a:p>
+        </p:txBody>
+      </p:sp>
+      <p:sp>
+        <p:nvSpPr>
+          <p:cNvPr id="34" name="직사각형 33">
+            <a:extLst>
+              <a:ext uri="{FF2B5EF4-FFF2-40B4-BE49-F238E27FC236}">
+                <a16:creationId xmlns:a16="http://schemas.microsoft.com/office/drawing/2014/main" id="{B31A07A2-941E-80C8-A861-C5E690A20184}"/>
+              </a:ext>
+            </a:extLst>
+          </p:cNvPr>
+          <p:cNvSpPr/>
+          <p:nvPr/>
+        </p:nvSpPr>
+        <p:spPr>
+          <a:xfrm>
+            <a:off x="3880086" y="4286251"/>
+            <a:ext cx="1485900" cy="457200"/>
+          </a:xfrm>
+          <a:prstGeom prst="rect">
+            <a:avLst/>
+          </a:prstGeom>
+        </p:spPr>
+        <p:style>
+          <a:lnRef idx="2">
+            <a:schemeClr val="accent1">
+              <a:shade val="50000"/>
+            </a:schemeClr>
+          </a:lnRef>
+          <a:fillRef idx="1">
+            <a:schemeClr val="accent1"/>
+          </a:fillRef>
+          <a:effectRef idx="0">
+            <a:schemeClr val="accent1"/>
+          </a:effectRef>
+          <a:fontRef idx="minor">
+            <a:schemeClr val="lt1"/>
+          </a:fontRef>
+        </p:style>
+        <p:txBody>
+          <a:bodyPr rtlCol="0" anchor="ctr"/>
+          <a:lstStyle/>
+          <a:p>
+            <a:pPr algn="ctr"/>
+            <a:r>
+              <a:rPr lang="en-US" altLang="ko-KR" dirty="0" err="1"/>
+              <a:t>TextView</a:t>
+            </a:r>
+            <a:endParaRPr lang="ko-KR" altLang="en-US" dirty="0"/>
+          </a:p>
+        </p:txBody>
+      </p:sp>
+      <p:sp>
+        <p:nvSpPr>
+          <p:cNvPr id="35" name="직사각형 34">
+            <a:extLst>
+              <a:ext uri="{FF2B5EF4-FFF2-40B4-BE49-F238E27FC236}">
+                <a16:creationId xmlns:a16="http://schemas.microsoft.com/office/drawing/2014/main" id="{7C5D983D-4EB9-703D-40EC-3944D53E89A5}"/>
+              </a:ext>
+            </a:extLst>
+          </p:cNvPr>
+          <p:cNvSpPr/>
+          <p:nvPr/>
+        </p:nvSpPr>
+        <p:spPr>
+          <a:xfrm>
+            <a:off x="6483468" y="4286251"/>
+            <a:ext cx="1485900" cy="457200"/>
+          </a:xfrm>
+          <a:prstGeom prst="rect">
+            <a:avLst/>
+          </a:prstGeom>
+        </p:spPr>
+        <p:style>
+          <a:lnRef idx="2">
+            <a:schemeClr val="accent1">
+              <a:shade val="50000"/>
+            </a:schemeClr>
+          </a:lnRef>
+          <a:fillRef idx="1">
+            <a:schemeClr val="accent1"/>
+          </a:fillRef>
+          <a:effectRef idx="0">
+            <a:schemeClr val="accent1"/>
+          </a:effectRef>
+          <a:fontRef idx="minor">
+            <a:schemeClr val="lt1"/>
+          </a:fontRef>
+        </p:style>
+        <p:txBody>
+          <a:bodyPr rtlCol="0" anchor="ctr"/>
+          <a:lstStyle/>
+          <a:p>
+            <a:pPr algn="ctr"/>
+            <a:r>
+              <a:rPr lang="en-US" altLang="ko-KR" dirty="0"/>
+              <a:t>decorator</a:t>
+            </a:r>
+            <a:endParaRPr lang="ko-KR" altLang="en-US" dirty="0"/>
+          </a:p>
+        </p:txBody>
+      </p:sp>
+      <p:sp>
+        <p:nvSpPr>
+          <p:cNvPr id="36" name="직사각형 35">
+            <a:extLst>
+              <a:ext uri="{FF2B5EF4-FFF2-40B4-BE49-F238E27FC236}">
+                <a16:creationId xmlns:a16="http://schemas.microsoft.com/office/drawing/2014/main" id="{C53D0EBC-8129-06D7-772E-4A2E600399B8}"/>
+              </a:ext>
+            </a:extLst>
+          </p:cNvPr>
+          <p:cNvSpPr/>
+          <p:nvPr/>
+        </p:nvSpPr>
+        <p:spPr>
+          <a:xfrm>
+            <a:off x="5457825" y="5410200"/>
+            <a:ext cx="1485900" cy="457200"/>
+          </a:xfrm>
+          <a:prstGeom prst="rect">
+            <a:avLst/>
+          </a:prstGeom>
+        </p:spPr>
+        <p:style>
+          <a:lnRef idx="2">
+            <a:schemeClr val="accent1">
+              <a:shade val="50000"/>
+            </a:schemeClr>
+          </a:lnRef>
+          <a:fillRef idx="1">
+            <a:schemeClr val="accent1"/>
+          </a:fillRef>
+          <a:effectRef idx="0">
+            <a:schemeClr val="accent1"/>
+          </a:effectRef>
+          <a:fontRef idx="minor">
+            <a:schemeClr val="lt1"/>
+          </a:fontRef>
+        </p:style>
+        <p:txBody>
+          <a:bodyPr rtlCol="0" anchor="ctr"/>
+          <a:lstStyle/>
+          <a:p>
+            <a:pPr algn="ctr"/>
+            <a:r>
+              <a:rPr lang="en-US" altLang="ko-KR" dirty="0" err="1"/>
+              <a:t>ScrollDeco</a:t>
+            </a:r>
+            <a:endParaRPr lang="ko-KR" altLang="en-US" dirty="0"/>
+          </a:p>
+        </p:txBody>
+      </p:sp>
+      <p:sp>
+        <p:nvSpPr>
+          <p:cNvPr id="37" name="직사각형 36">
+            <a:extLst>
+              <a:ext uri="{FF2B5EF4-FFF2-40B4-BE49-F238E27FC236}">
+                <a16:creationId xmlns:a16="http://schemas.microsoft.com/office/drawing/2014/main" id="{F7EF1E96-DF99-031D-F2F0-9642412043DB}"/>
+              </a:ext>
+            </a:extLst>
+          </p:cNvPr>
+          <p:cNvSpPr/>
+          <p:nvPr/>
+        </p:nvSpPr>
+        <p:spPr>
+          <a:xfrm>
+            <a:off x="7567613" y="5410200"/>
+            <a:ext cx="1485900" cy="457200"/>
+          </a:xfrm>
+          <a:prstGeom prst="rect">
+            <a:avLst/>
+          </a:prstGeom>
+        </p:spPr>
+        <p:style>
+          <a:lnRef idx="2">
+            <a:schemeClr val="accent1">
+              <a:shade val="50000"/>
+            </a:schemeClr>
+          </a:lnRef>
+          <a:fillRef idx="1">
+            <a:schemeClr val="accent1"/>
+          </a:fillRef>
+          <a:effectRef idx="0">
+            <a:schemeClr val="accent1"/>
+          </a:effectRef>
+          <a:fontRef idx="minor">
+            <a:schemeClr val="lt1"/>
+          </a:fontRef>
+        </p:style>
+        <p:txBody>
+          <a:bodyPr rtlCol="0" anchor="ctr"/>
+          <a:lstStyle/>
+          <a:p>
+            <a:pPr algn="ctr"/>
+            <a:r>
+              <a:rPr lang="en-US" altLang="ko-KR" dirty="0" err="1"/>
+              <a:t>BorderDeco</a:t>
+            </a:r>
+            <a:endParaRPr lang="ko-KR" altLang="en-US" dirty="0"/>
+          </a:p>
+        </p:txBody>
+      </p:sp>
+      <p:cxnSp>
+        <p:nvCxnSpPr>
+          <p:cNvPr id="39" name="연결선: 꺾임 38">
+            <a:extLst>
+              <a:ext uri="{FF2B5EF4-FFF2-40B4-BE49-F238E27FC236}">
+                <a16:creationId xmlns:a16="http://schemas.microsoft.com/office/drawing/2014/main" id="{4E3CD424-2DC6-6D8F-221C-ADB3C90F31F7}"/>
+              </a:ext>
+            </a:extLst>
+          </p:cNvPr>
+          <p:cNvCxnSpPr>
+            <a:stCxn id="33" idx="2"/>
+            <a:endCxn id="34" idx="0"/>
+          </p:cNvCxnSpPr>
+          <p:nvPr/>
+        </p:nvCxnSpPr>
+        <p:spPr>
+          <a:xfrm rot="5400000">
+            <a:off x="5049192" y="3440995"/>
+            <a:ext cx="419101" cy="1271411"/>
+          </a:xfrm>
+          <a:prstGeom prst="bentConnector3">
+            <a:avLst/>
+          </a:prstGeom>
+          <a:ln>
+            <a:tailEnd type="triangle"/>
+          </a:ln>
+        </p:spPr>
+        <p:style>
+          <a:lnRef idx="1">
+            <a:schemeClr val="accent1"/>
+          </a:lnRef>
+          <a:fillRef idx="0">
+            <a:schemeClr val="accent1"/>
+          </a:fillRef>
+          <a:effectRef idx="0">
+            <a:schemeClr val="accent1"/>
+          </a:effectRef>
+          <a:fontRef idx="minor">
+            <a:schemeClr val="tx1"/>
+          </a:fontRef>
+        </p:style>
+      </p:cxnSp>
+      <p:cxnSp>
+        <p:nvCxnSpPr>
+          <p:cNvPr id="41" name="연결선: 꺾임 40">
+            <a:extLst>
+              <a:ext uri="{FF2B5EF4-FFF2-40B4-BE49-F238E27FC236}">
+                <a16:creationId xmlns:a16="http://schemas.microsoft.com/office/drawing/2014/main" id="{80BD91D5-E571-1005-7F0F-9CEFF4154AFC}"/>
+              </a:ext>
+            </a:extLst>
+          </p:cNvPr>
+          <p:cNvCxnSpPr>
+            <a:stCxn id="33" idx="2"/>
+            <a:endCxn id="35" idx="0"/>
+          </p:cNvCxnSpPr>
+          <p:nvPr/>
+        </p:nvCxnSpPr>
+        <p:spPr>
+          <a:xfrm rot="16200000" flipH="1">
+            <a:off x="6350882" y="3410714"/>
+            <a:ext cx="419101" cy="1331971"/>
+          </a:xfrm>
+          <a:prstGeom prst="bentConnector3">
+            <a:avLst/>
+          </a:prstGeom>
+          <a:ln>
+            <a:tailEnd type="triangle"/>
+          </a:ln>
+        </p:spPr>
+        <p:style>
+          <a:lnRef idx="1">
+            <a:schemeClr val="accent1"/>
+          </a:lnRef>
+          <a:fillRef idx="0">
+            <a:schemeClr val="accent1"/>
+          </a:fillRef>
+          <a:effectRef idx="0">
+            <a:schemeClr val="accent1"/>
+          </a:effectRef>
+          <a:fontRef idx="minor">
+            <a:schemeClr val="tx1"/>
+          </a:fontRef>
+        </p:style>
+      </p:cxnSp>
+      <p:cxnSp>
+        <p:nvCxnSpPr>
+          <p:cNvPr id="43" name="연결선: 꺾임 42">
+            <a:extLst>
+              <a:ext uri="{FF2B5EF4-FFF2-40B4-BE49-F238E27FC236}">
+                <a16:creationId xmlns:a16="http://schemas.microsoft.com/office/drawing/2014/main" id="{B5770BB4-49D7-DFB7-5C72-E297A62825EB}"/>
+              </a:ext>
+            </a:extLst>
+          </p:cNvPr>
+          <p:cNvCxnSpPr>
+            <a:stCxn id="35" idx="2"/>
+            <a:endCxn id="36" idx="0"/>
+          </p:cNvCxnSpPr>
+          <p:nvPr/>
+        </p:nvCxnSpPr>
+        <p:spPr>
+          <a:xfrm rot="5400000">
+            <a:off x="6380223" y="4564004"/>
+            <a:ext cx="666749" cy="1025643"/>
+          </a:xfrm>
+          <a:prstGeom prst="bentConnector3">
+            <a:avLst/>
+          </a:prstGeom>
+          <a:ln>
+            <a:tailEnd type="triangle"/>
+          </a:ln>
+        </p:spPr>
+        <p:style>
+          <a:lnRef idx="1">
+            <a:schemeClr val="accent1"/>
+          </a:lnRef>
+          <a:fillRef idx="0">
+            <a:schemeClr val="accent1"/>
+          </a:fillRef>
+          <a:effectRef idx="0">
+            <a:schemeClr val="accent1"/>
+          </a:effectRef>
+          <a:fontRef idx="minor">
+            <a:schemeClr val="tx1"/>
+          </a:fontRef>
+        </p:style>
+      </p:cxnSp>
+      <p:cxnSp>
+        <p:nvCxnSpPr>
+          <p:cNvPr id="45" name="연결선: 꺾임 44">
+            <a:extLst>
+              <a:ext uri="{FF2B5EF4-FFF2-40B4-BE49-F238E27FC236}">
+                <a16:creationId xmlns:a16="http://schemas.microsoft.com/office/drawing/2014/main" id="{09E0816C-CE1B-40A7-7937-BEE0D4F80221}"/>
+              </a:ext>
+            </a:extLst>
+          </p:cNvPr>
+          <p:cNvCxnSpPr>
+            <a:stCxn id="35" idx="2"/>
+            <a:endCxn id="37" idx="0"/>
+          </p:cNvCxnSpPr>
+          <p:nvPr/>
+        </p:nvCxnSpPr>
+        <p:spPr>
+          <a:xfrm rot="16200000" flipH="1">
+            <a:off x="7435116" y="4534752"/>
+            <a:ext cx="666749" cy="1084145"/>
+          </a:xfrm>
+          <a:prstGeom prst="bentConnector3">
+            <a:avLst/>
+          </a:prstGeom>
+          <a:ln>
+            <a:tailEnd type="triangle"/>
+          </a:ln>
+        </p:spPr>
+        <p:style>
+          <a:lnRef idx="1">
+            <a:schemeClr val="accent1"/>
+          </a:lnRef>
+          <a:fillRef idx="0">
+            <a:schemeClr val="accent1"/>
+          </a:fillRef>
+          <a:effectRef idx="0">
+            <a:schemeClr val="accent1"/>
+          </a:effectRef>
+          <a:fontRef idx="minor">
+            <a:schemeClr val="tx1"/>
+          </a:fontRef>
+        </p:style>
+      </p:cxnSp>
+    </p:spTree>
+    <p:extLst>
+      <p:ext uri="{BB962C8B-B14F-4D97-AF65-F5344CB8AC3E}">
+        <p14:creationId xmlns:p14="http://schemas.microsoft.com/office/powerpoint/2010/main" val="2189583216"/>
+      </p:ext>
+    </p:extLst>
+  </p:cSld>
+  <p:clrMapOvr>
+    <a:masterClrMapping/>
+  </p:clrMapOvr>
 </p:sld>
 </file>
 

</xml_diff>